<commit_message>
Passwortverschlüsselung mit MD5 im WebClient
</commit_message>
<xml_diff>
--- a/Ue3_Präs.pptx
+++ b/Ue3_Präs.pptx
@@ -109,6 +109,11 @@
       </a:defRPr>
     </a:lvl9pPr>
   </p:defaultTextStyle>
+  <p:extLst>
+    <p:ext uri="{EFAFB233-063F-42B5-8137-9DF3F51BA10A}">
+      <p15:sldGuideLst xmlns:p15="http://schemas.microsoft.com/office/powerpoint/2012/main"/>
+    </p:ext>
+  </p:extLst>
 </p:presentation>
 </file>
 
@@ -338,7 +343,7 @@
           <a:p>
             <a:fld id="{4BDF68E2-58F2-4D09-BE8B-E3BD06533059}" type="datetimeFigureOut">
               <a:rPr lang="en-US" dirty="0"/>
-              <a:t>1/8/17</a:t>
+              <a:t>1/9/17</a:t>
             </a:fld>
             <a:endParaRPr lang="en-US" dirty="0"/>
           </a:p>
@@ -541,7 +546,7 @@
           <a:p>
             <a:fld id="{2E2D6473-DF6D-4702-B328-E0DD40540A4E}" type="datetimeFigureOut">
               <a:rPr lang="en-US" dirty="0"/>
-              <a:t>1/8/17</a:t>
+              <a:t>1/9/17</a:t>
             </a:fld>
             <a:endParaRPr lang="en-US" dirty="0"/>
           </a:p>
@@ -792,7 +797,7 @@
           <a:p>
             <a:fld id="{E26F7E3A-B166-407D-9866-32884E7D5B37}" type="datetimeFigureOut">
               <a:rPr lang="en-US" dirty="0"/>
-              <a:t>1/8/17</a:t>
+              <a:t>1/9/17</a:t>
             </a:fld>
             <a:endParaRPr lang="en-US" dirty="0"/>
           </a:p>
@@ -961,7 +966,7 @@
           <a:p>
             <a:fld id="{528FC5F6-F338-4AE4-BB23-26385BCFC423}" type="datetimeFigureOut">
               <a:rPr lang="en-US" dirty="0"/>
-              <a:t>1/8/17</a:t>
+              <a:t>1/9/17</a:t>
             </a:fld>
             <a:endParaRPr lang="en-US" dirty="0"/>
           </a:p>
@@ -1299,7 +1304,7 @@
           <a:p>
             <a:fld id="{20EBB0C4-6273-4C6E-B9BD-2EDC30F1CD52}" type="datetimeFigureOut">
               <a:rPr lang="en-US" dirty="0"/>
-              <a:t>1/8/17</a:t>
+              <a:t>1/9/17</a:t>
             </a:fld>
             <a:endParaRPr lang="en-US" dirty="0"/>
           </a:p>
@@ -1569,7 +1574,7 @@
           <a:p>
             <a:fld id="{19AB4D41-86C1-4908-B66A-0B50CEB3BF29}" type="datetimeFigureOut">
               <a:rPr lang="en-US" dirty="0"/>
-              <a:t>1/8/17</a:t>
+              <a:t>1/9/17</a:t>
             </a:fld>
             <a:endParaRPr lang="en-US" dirty="0"/>
           </a:p>
@@ -1943,7 +1948,7 @@
           <a:p>
             <a:fld id="{E6426E2C-56C1-4E0D-A793-0088A7FDD37E}" type="datetimeFigureOut">
               <a:rPr lang="en-US" dirty="0"/>
-              <a:t>1/8/17</a:t>
+              <a:t>1/9/17</a:t>
             </a:fld>
             <a:endParaRPr lang="en-US" dirty="0"/>
           </a:p>
@@ -2056,7 +2061,7 @@
           <a:p>
             <a:fld id="{C8C39B41-D8B5-4052-B551-9B5525EAA8B6}" type="datetimeFigureOut">
               <a:rPr lang="en-US" dirty="0"/>
-              <a:t>1/8/17</a:t>
+              <a:t>1/9/17</a:t>
             </a:fld>
             <a:endParaRPr lang="en-US" dirty="0"/>
           </a:p>
@@ -2222,7 +2227,7 @@
           <a:p>
             <a:fld id="{4D94136C-8742-45B2-AF27-D93DF72833A9}" type="datetimeFigureOut">
               <a:rPr lang="en-US" dirty="0"/>
-              <a:t>1/8/17</a:t>
+              <a:t>1/9/17</a:t>
             </a:fld>
             <a:endParaRPr lang="en-US" dirty="0"/>
           </a:p>
@@ -2572,7 +2577,7 @@
           <a:p>
             <a:fld id="{32ABBEA6-7C60-4B02-AE87-00D78D8422AF}" type="datetimeFigureOut">
               <a:rPr lang="en-US" dirty="0"/>
-              <a:t>1/8/17</a:t>
+              <a:t>1/9/17</a:t>
             </a:fld>
             <a:endParaRPr lang="en-US" dirty="0"/>
           </a:p>
@@ -2947,7 +2952,7 @@
           <a:p>
             <a:fld id="{C9CAD897-D46E-4AD2-BD9B-49DD3E640873}" type="datetimeFigureOut">
               <a:rPr lang="en-US" dirty="0"/>
-              <a:t>1/8/17</a:t>
+              <a:t>1/9/17</a:t>
             </a:fld>
             <a:endParaRPr lang="en-US" dirty="0"/>
           </a:p>
@@ -3229,7 +3234,7 @@
           <a:p>
             <a:fld id="{98624D31-43A5-475A-80CF-332C9F6DCF35}" type="datetimeFigureOut">
               <a:rPr lang="en-US" dirty="0"/>
-              <a:t>1/8/17</a:t>
+              <a:t>1/9/17</a:t>
             </a:fld>
             <a:endParaRPr lang="en-US" dirty="0"/>
           </a:p>
@@ -3842,8 +3847,8 @@
           <a:lstStyle/>
           <a:p>
             <a:r>
-              <a:rPr lang="de-DE" dirty="0" smtClean="0"/>
-              <a:t>Schnittstelle</a:t>
+              <a:rPr lang="de-DE" smtClean="0"/>
+              <a:t>Datenaustausch</a:t>
             </a:r>
             <a:endParaRPr lang="de-DE" dirty="0"/>
           </a:p>
@@ -4320,7 +4325,7 @@
           <a:p>
             <a:r>
               <a:rPr lang="de-DE" dirty="0" smtClean="0"/>
-              <a:t>Schnittstelle</a:t>
+              <a:t>Funktionalität</a:t>
             </a:r>
             <a:endParaRPr lang="de-DE" dirty="0"/>
           </a:p>
@@ -5731,7 +5736,7 @@
             <p:ph idx="1"/>
             <p:extLst>
               <p:ext uri="{D42A27DB-BD31-4B8C-83A1-F6EECF244321}">
-                <p14:modId xmlns:p14="http://schemas.microsoft.com/office/powerpoint/2010/main" val="1345620691"/>
+                <p14:modId xmlns:p14="http://schemas.microsoft.com/office/powerpoint/2010/main" val="1063904725"/>
               </p:ext>
             </p:extLst>
           </p:nvPr>
@@ -5896,7 +5901,15 @@
                     <a:p>
                       <a:r>
                         <a:rPr lang="de-DE" dirty="0" smtClean="0"/>
-                        <a:t>teilweise</a:t>
+                        <a:t>HTTP</a:t>
+                      </a:r>
+                      <a:r>
+                        <a:rPr lang="de-DE" baseline="0" dirty="0" smtClean="0"/>
+                        <a:t> </a:t>
+                      </a:r>
+                      <a:r>
+                        <a:rPr lang="de-DE" baseline="0" dirty="0" err="1" smtClean="0"/>
+                        <a:t>Requests</a:t>
                       </a:r>
                       <a:endParaRPr lang="de-DE" dirty="0"/>
                     </a:p>

</xml_diff>